<commit_message>
pptx 26-10-2020 - 27-10-2020 DONE
</commit_message>
<xml_diff>
--- a/Week 2/26-10-2020/pptx/26-10-2020 - 27-10-2020.pptx
+++ b/Week 2/26-10-2020/pptx/26-10-2020 - 27-10-2020.pptx
@@ -14517,6 +14517,412 @@
       </p:transition>
     </mc:Fallback>
   </mc:AlternateContent>
+  <p:timing>
+    <p:tnLst>
+      <p:par>
+        <p:cTn id="1" dur="indefinite" restart="never" nodeType="tmRoot">
+          <p:childTnLst>
+            <p:seq concurrent="1" nextAc="seek">
+              <p:cTn id="2" dur="indefinite" nodeType="mainSeq">
+                <p:childTnLst>
+                  <p:par>
+                    <p:cTn id="3" fill="hold">
+                      <p:stCondLst>
+                        <p:cond delay="indefinite"/>
+                      </p:stCondLst>
+                      <p:childTnLst>
+                        <p:par>
+                          <p:cTn id="4" fill="hold">
+                            <p:stCondLst>
+                              <p:cond delay="0"/>
+                            </p:stCondLst>
+                            <p:childTnLst>
+                              <p:par>
+                                <p:cTn id="5" presetID="10" presetClass="entr" presetSubtype="0" fill="hold" grpId="0" nodeType="clickEffect">
+                                  <p:stCondLst>
+                                    <p:cond delay="0"/>
+                                  </p:stCondLst>
+                                  <p:childTnLst>
+                                    <p:set>
+                                      <p:cBhvr>
+                                        <p:cTn id="6" dur="1" fill="hold">
+                                          <p:stCondLst>
+                                            <p:cond delay="0"/>
+                                          </p:stCondLst>
+                                        </p:cTn>
+                                        <p:tgtEl>
+                                          <p:spTgt spid="10"/>
+                                        </p:tgtEl>
+                                        <p:attrNameLst>
+                                          <p:attrName>style.visibility</p:attrName>
+                                        </p:attrNameLst>
+                                      </p:cBhvr>
+                                      <p:to>
+                                        <p:strVal val="visible"/>
+                                      </p:to>
+                                    </p:set>
+                                    <p:animEffect transition="in" filter="fade">
+                                      <p:cBhvr>
+                                        <p:cTn id="7" dur="500"/>
+                                        <p:tgtEl>
+                                          <p:spTgt spid="10"/>
+                                        </p:tgtEl>
+                                      </p:cBhvr>
+                                    </p:animEffect>
+                                  </p:childTnLst>
+                                </p:cTn>
+                              </p:par>
+                            </p:childTnLst>
+                          </p:cTn>
+                        </p:par>
+                      </p:childTnLst>
+                    </p:cTn>
+                  </p:par>
+                  <p:par>
+                    <p:cTn id="8" fill="hold">
+                      <p:stCondLst>
+                        <p:cond delay="indefinite"/>
+                      </p:stCondLst>
+                      <p:childTnLst>
+                        <p:par>
+                          <p:cTn id="9" fill="hold">
+                            <p:stCondLst>
+                              <p:cond delay="0"/>
+                            </p:stCondLst>
+                            <p:childTnLst>
+                              <p:par>
+                                <p:cTn id="10" presetID="10" presetClass="entr" presetSubtype="0" fill="hold" grpId="0" nodeType="clickEffect">
+                                  <p:stCondLst>
+                                    <p:cond delay="0"/>
+                                  </p:stCondLst>
+                                  <p:childTnLst>
+                                    <p:set>
+                                      <p:cBhvr>
+                                        <p:cTn id="11" dur="1" fill="hold">
+                                          <p:stCondLst>
+                                            <p:cond delay="0"/>
+                                          </p:stCondLst>
+                                        </p:cTn>
+                                        <p:tgtEl>
+                                          <p:spTgt spid="11"/>
+                                        </p:tgtEl>
+                                        <p:attrNameLst>
+                                          <p:attrName>style.visibility</p:attrName>
+                                        </p:attrNameLst>
+                                      </p:cBhvr>
+                                      <p:to>
+                                        <p:strVal val="visible"/>
+                                      </p:to>
+                                    </p:set>
+                                    <p:animEffect transition="in" filter="fade">
+                                      <p:cBhvr>
+                                        <p:cTn id="12" dur="500"/>
+                                        <p:tgtEl>
+                                          <p:spTgt spid="11"/>
+                                        </p:tgtEl>
+                                      </p:cBhvr>
+                                    </p:animEffect>
+                                  </p:childTnLst>
+                                </p:cTn>
+                              </p:par>
+                            </p:childTnLst>
+                          </p:cTn>
+                        </p:par>
+                      </p:childTnLst>
+                    </p:cTn>
+                  </p:par>
+                  <p:par>
+                    <p:cTn id="13" fill="hold">
+                      <p:stCondLst>
+                        <p:cond delay="indefinite"/>
+                      </p:stCondLst>
+                      <p:childTnLst>
+                        <p:par>
+                          <p:cTn id="14" fill="hold">
+                            <p:stCondLst>
+                              <p:cond delay="0"/>
+                            </p:stCondLst>
+                            <p:childTnLst>
+                              <p:par>
+                                <p:cTn id="15" presetID="10" presetClass="entr" presetSubtype="0" fill="hold" grpId="0" nodeType="clickEffect">
+                                  <p:stCondLst>
+                                    <p:cond delay="0"/>
+                                  </p:stCondLst>
+                                  <p:childTnLst>
+                                    <p:set>
+                                      <p:cBhvr>
+                                        <p:cTn id="16" dur="1" fill="hold">
+                                          <p:stCondLst>
+                                            <p:cond delay="0"/>
+                                          </p:stCondLst>
+                                        </p:cTn>
+                                        <p:tgtEl>
+                                          <p:spTgt spid="12"/>
+                                        </p:tgtEl>
+                                        <p:attrNameLst>
+                                          <p:attrName>style.visibility</p:attrName>
+                                        </p:attrNameLst>
+                                      </p:cBhvr>
+                                      <p:to>
+                                        <p:strVal val="visible"/>
+                                      </p:to>
+                                    </p:set>
+                                    <p:animEffect transition="in" filter="fade">
+                                      <p:cBhvr>
+                                        <p:cTn id="17" dur="500"/>
+                                        <p:tgtEl>
+                                          <p:spTgt spid="12"/>
+                                        </p:tgtEl>
+                                      </p:cBhvr>
+                                    </p:animEffect>
+                                  </p:childTnLst>
+                                </p:cTn>
+                              </p:par>
+                            </p:childTnLst>
+                          </p:cTn>
+                        </p:par>
+                      </p:childTnLst>
+                    </p:cTn>
+                  </p:par>
+                  <p:par>
+                    <p:cTn id="18" fill="hold">
+                      <p:stCondLst>
+                        <p:cond delay="indefinite"/>
+                      </p:stCondLst>
+                      <p:childTnLst>
+                        <p:par>
+                          <p:cTn id="19" fill="hold">
+                            <p:stCondLst>
+                              <p:cond delay="0"/>
+                            </p:stCondLst>
+                            <p:childTnLst>
+                              <p:par>
+                                <p:cTn id="20" presetID="10" presetClass="entr" presetSubtype="0" fill="hold" nodeType="clickEffect">
+                                  <p:stCondLst>
+                                    <p:cond delay="0"/>
+                                  </p:stCondLst>
+                                  <p:childTnLst>
+                                    <p:set>
+                                      <p:cBhvr>
+                                        <p:cTn id="21" dur="1" fill="hold">
+                                          <p:stCondLst>
+                                            <p:cond delay="0"/>
+                                          </p:stCondLst>
+                                        </p:cTn>
+                                        <p:tgtEl>
+                                          <p:spTgt spid="22"/>
+                                        </p:tgtEl>
+                                        <p:attrNameLst>
+                                          <p:attrName>style.visibility</p:attrName>
+                                        </p:attrNameLst>
+                                      </p:cBhvr>
+                                      <p:to>
+                                        <p:strVal val="visible"/>
+                                      </p:to>
+                                    </p:set>
+                                    <p:animEffect transition="in" filter="fade">
+                                      <p:cBhvr>
+                                        <p:cTn id="22" dur="500"/>
+                                        <p:tgtEl>
+                                          <p:spTgt spid="22"/>
+                                        </p:tgtEl>
+                                      </p:cBhvr>
+                                    </p:animEffect>
+                                  </p:childTnLst>
+                                </p:cTn>
+                              </p:par>
+                            </p:childTnLst>
+                          </p:cTn>
+                        </p:par>
+                      </p:childTnLst>
+                    </p:cTn>
+                  </p:par>
+                  <p:par>
+                    <p:cTn id="23" fill="hold">
+                      <p:stCondLst>
+                        <p:cond delay="indefinite"/>
+                      </p:stCondLst>
+                      <p:childTnLst>
+                        <p:par>
+                          <p:cTn id="24" fill="hold">
+                            <p:stCondLst>
+                              <p:cond delay="0"/>
+                            </p:stCondLst>
+                            <p:childTnLst>
+                              <p:par>
+                                <p:cTn id="25" presetID="10" presetClass="entr" presetSubtype="0" fill="hold" nodeType="clickEffect">
+                                  <p:stCondLst>
+                                    <p:cond delay="0"/>
+                                  </p:stCondLst>
+                                  <p:childTnLst>
+                                    <p:set>
+                                      <p:cBhvr>
+                                        <p:cTn id="26" dur="1" fill="hold">
+                                          <p:stCondLst>
+                                            <p:cond delay="0"/>
+                                          </p:stCondLst>
+                                        </p:cTn>
+                                        <p:tgtEl>
+                                          <p:spTgt spid="8"/>
+                                        </p:tgtEl>
+                                        <p:attrNameLst>
+                                          <p:attrName>style.visibility</p:attrName>
+                                        </p:attrNameLst>
+                                      </p:cBhvr>
+                                      <p:to>
+                                        <p:strVal val="visible"/>
+                                      </p:to>
+                                    </p:set>
+                                    <p:animEffect transition="in" filter="fade">
+                                      <p:cBhvr>
+                                        <p:cTn id="27" dur="500"/>
+                                        <p:tgtEl>
+                                          <p:spTgt spid="8"/>
+                                        </p:tgtEl>
+                                      </p:cBhvr>
+                                    </p:animEffect>
+                                  </p:childTnLst>
+                                </p:cTn>
+                              </p:par>
+                            </p:childTnLst>
+                          </p:cTn>
+                        </p:par>
+                      </p:childTnLst>
+                    </p:cTn>
+                  </p:par>
+                  <p:par>
+                    <p:cTn id="28" fill="hold">
+                      <p:stCondLst>
+                        <p:cond delay="indefinite"/>
+                      </p:stCondLst>
+                      <p:childTnLst>
+                        <p:par>
+                          <p:cTn id="29" fill="hold">
+                            <p:stCondLst>
+                              <p:cond delay="0"/>
+                            </p:stCondLst>
+                            <p:childTnLst>
+                              <p:par>
+                                <p:cTn id="30" presetID="10" presetClass="entr" presetSubtype="0" fill="hold" nodeType="clickEffect">
+                                  <p:stCondLst>
+                                    <p:cond delay="0"/>
+                                  </p:stCondLst>
+                                  <p:childTnLst>
+                                    <p:set>
+                                      <p:cBhvr>
+                                        <p:cTn id="31" dur="1" fill="hold">
+                                          <p:stCondLst>
+                                            <p:cond delay="0"/>
+                                          </p:stCondLst>
+                                        </p:cTn>
+                                        <p:tgtEl>
+                                          <p:spTgt spid="20"/>
+                                        </p:tgtEl>
+                                        <p:attrNameLst>
+                                          <p:attrName>style.visibility</p:attrName>
+                                        </p:attrNameLst>
+                                      </p:cBhvr>
+                                      <p:to>
+                                        <p:strVal val="visible"/>
+                                      </p:to>
+                                    </p:set>
+                                    <p:animEffect transition="in" filter="fade">
+                                      <p:cBhvr>
+                                        <p:cTn id="32" dur="500"/>
+                                        <p:tgtEl>
+                                          <p:spTgt spid="20"/>
+                                        </p:tgtEl>
+                                      </p:cBhvr>
+                                    </p:animEffect>
+                                  </p:childTnLst>
+                                </p:cTn>
+                              </p:par>
+                            </p:childTnLst>
+                          </p:cTn>
+                        </p:par>
+                      </p:childTnLst>
+                    </p:cTn>
+                  </p:par>
+                  <p:par>
+                    <p:cTn id="33" fill="hold">
+                      <p:stCondLst>
+                        <p:cond delay="indefinite"/>
+                      </p:stCondLst>
+                      <p:childTnLst>
+                        <p:par>
+                          <p:cTn id="34" fill="hold">
+                            <p:stCondLst>
+                              <p:cond delay="0"/>
+                            </p:stCondLst>
+                            <p:childTnLst>
+                              <p:par>
+                                <p:cTn id="35" presetID="10" presetClass="entr" presetSubtype="0" fill="hold" nodeType="clickEffect">
+                                  <p:stCondLst>
+                                    <p:cond delay="0"/>
+                                  </p:stCondLst>
+                                  <p:childTnLst>
+                                    <p:set>
+                                      <p:cBhvr>
+                                        <p:cTn id="36" dur="1" fill="hold">
+                                          <p:stCondLst>
+                                            <p:cond delay="0"/>
+                                          </p:stCondLst>
+                                        </p:cTn>
+                                        <p:tgtEl>
+                                          <p:spTgt spid="23"/>
+                                        </p:tgtEl>
+                                        <p:attrNameLst>
+                                          <p:attrName>style.visibility</p:attrName>
+                                        </p:attrNameLst>
+                                      </p:cBhvr>
+                                      <p:to>
+                                        <p:strVal val="visible"/>
+                                      </p:to>
+                                    </p:set>
+                                    <p:animEffect transition="in" filter="fade">
+                                      <p:cBhvr>
+                                        <p:cTn id="37" dur="500"/>
+                                        <p:tgtEl>
+                                          <p:spTgt spid="23"/>
+                                        </p:tgtEl>
+                                      </p:cBhvr>
+                                    </p:animEffect>
+                                  </p:childTnLst>
+                                </p:cTn>
+                              </p:par>
+                            </p:childTnLst>
+                          </p:cTn>
+                        </p:par>
+                      </p:childTnLst>
+                    </p:cTn>
+                  </p:par>
+                </p:childTnLst>
+              </p:cTn>
+              <p:prevCondLst>
+                <p:cond evt="onPrev" delay="0">
+                  <p:tgtEl>
+                    <p:sldTgt/>
+                  </p:tgtEl>
+                </p:cond>
+              </p:prevCondLst>
+              <p:nextCondLst>
+                <p:cond evt="onNext" delay="0">
+                  <p:tgtEl>
+                    <p:sldTgt/>
+                  </p:tgtEl>
+                </p:cond>
+              </p:nextCondLst>
+            </p:seq>
+          </p:childTnLst>
+        </p:cTn>
+      </p:par>
+    </p:tnLst>
+    <p:bldLst>
+      <p:bldP spid="10" grpId="0"/>
+      <p:bldP spid="11" grpId="0"/>
+      <p:bldP spid="12" grpId="0"/>
+    </p:bldLst>
+  </p:timing>
 </p:sld>
 </file>
 
@@ -22499,14 +22905,6 @@
 </file>
 
 <file path=customXml/item1.xml><?xml version="1.0" encoding="utf-8"?>
-<p:properties xmlns:p="http://schemas.microsoft.com/office/2006/metadata/properties" xmlns:xsi="http://www.w3.org/2001/XMLSchema-instance" xmlns:pc="http://schemas.microsoft.com/office/infopath/2007/PartnerControls">
-  <documentManagement>
-    <MediaServiceKeyPoints xmlns="71af3243-3dd4-4a8d-8c0d-dd76da1f02a5" xsi:nil="true"/>
-  </documentManagement>
-</p:properties>
-</file>
-
-<file path=customXml/item2.xml><?xml version="1.0" encoding="utf-8"?>
 <ct:contentTypeSchema xmlns:ct="http://schemas.microsoft.com/office/2006/metadata/contentType" xmlns:ma="http://schemas.microsoft.com/office/2006/metadata/properties/metaAttributes" ct:_="" ma:_="" ma:contentTypeName="Document" ma:contentTypeID="0x01010079F111ED35F8CC479449609E8A0923A6" ma:contentTypeVersion="11" ma:contentTypeDescription="Create a new document." ma:contentTypeScope="" ma:versionID="9677210f24a1be23c92c90fd886aa0aa">
   <xsd:schema xmlns:xsd="http://www.w3.org/2001/XMLSchema" xmlns:xs="http://www.w3.org/2001/XMLSchema" xmlns:p="http://schemas.microsoft.com/office/2006/metadata/properties" xmlns:ns2="71af3243-3dd4-4a8d-8c0d-dd76da1f02a5" xmlns:ns3="16c05727-aa75-4e4a-9b5f-8a80a1165891" targetNamespace="http://schemas.microsoft.com/office/2006/metadata/properties" ma:root="true" ma:fieldsID="60e05723c5c1908df1a1a4ebf11d344e" ns2:_="" ns3:_="">
     <xsd:import namespace="71af3243-3dd4-4a8d-8c0d-dd76da1f02a5"/>
@@ -22717,6 +23115,14 @@
 </ct:contentTypeSchema>
 </file>
 
+<file path=customXml/item2.xml><?xml version="1.0" encoding="utf-8"?>
+<p:properties xmlns:p="http://schemas.microsoft.com/office/2006/metadata/properties" xmlns:xsi="http://www.w3.org/2001/XMLSchema-instance" xmlns:pc="http://schemas.microsoft.com/office/infopath/2007/PartnerControls">
+  <documentManagement>
+    <MediaServiceKeyPoints xmlns="71af3243-3dd4-4a8d-8c0d-dd76da1f02a5" xsi:nil="true"/>
+  </documentManagement>
+</p:properties>
+</file>
+
 <file path=customXml/item3.xml><?xml version="1.0" encoding="utf-8"?>
 <?mso-contentType ?>
 <FormTemplates xmlns="http://schemas.microsoft.com/sharepoint/v3/contenttype/forms">
@@ -22727,16 +23133,6 @@
 </file>
 
 <file path=customXml/itemProps1.xml><?xml version="1.0" encoding="utf-8"?>
-<ds:datastoreItem xmlns:ds="http://schemas.openxmlformats.org/officeDocument/2006/customXml" ds:itemID="{96100F67-BC3D-46B4-8D39-802DC9D7F2EB}">
-  <ds:schemaRefs>
-    <ds:schemaRef ds:uri="http://schemas.microsoft.com/office/2006/metadata/properties"/>
-    <ds:schemaRef ds:uri="http://schemas.microsoft.com/office/infopath/2007/PartnerControls"/>
-    <ds:schemaRef ds:uri="71af3243-3dd4-4a8d-8c0d-dd76da1f02a5"/>
-  </ds:schemaRefs>
-</ds:datastoreItem>
-</file>
-
-<file path=customXml/itemProps2.xml><?xml version="1.0" encoding="utf-8"?>
 <ds:datastoreItem xmlns:ds="http://schemas.openxmlformats.org/officeDocument/2006/customXml" ds:itemID="{853D8350-BC36-420E-83B3-2CFFF4E97F6D}">
   <ds:schemaRefs>
     <ds:schemaRef ds:uri="http://schemas.microsoft.com/office/2006/metadata/contentType"/>
@@ -22755,6 +23151,16 @@
 </ds:datastoreItem>
 </file>
 
+<file path=customXml/itemProps2.xml><?xml version="1.0" encoding="utf-8"?>
+<ds:datastoreItem xmlns:ds="http://schemas.openxmlformats.org/officeDocument/2006/customXml" ds:itemID="{96100F67-BC3D-46B4-8D39-802DC9D7F2EB}">
+  <ds:schemaRefs>
+    <ds:schemaRef ds:uri="http://schemas.microsoft.com/office/2006/metadata/properties"/>
+    <ds:schemaRef ds:uri="http://schemas.microsoft.com/office/infopath/2007/PartnerControls"/>
+    <ds:schemaRef ds:uri="71af3243-3dd4-4a8d-8c0d-dd76da1f02a5"/>
+  </ds:schemaRefs>
+</ds:datastoreItem>
+</file>
+
 <file path=customXml/itemProps3.xml><?xml version="1.0" encoding="utf-8"?>
 <ds:datastoreItem xmlns:ds="http://schemas.openxmlformats.org/officeDocument/2006/customXml" ds:itemID="{47323504-CBC8-4A2F-BF86-8DF0D94D4A3D}">
   <ds:schemaRefs>

</xml_diff>